<commit_message>
Added pictures and updated readme
</commit_message>
<xml_diff>
--- a/PICTURES/cover.pptx
+++ b/PICTURES/cover.pptx
@@ -261,7 +261,7 @@
           <a:p>
             <a:fld id="{25CC940E-691B-47B1-B51D-00F434A09068}" type="datetimeFigureOut">
               <a:rPr lang="en-150" smtClean="0"/>
-              <a:t>03/04/2023</a:t>
+              <a:t>10/04/2023</a:t>
             </a:fld>
             <a:endParaRPr lang="en-150"/>
           </a:p>
@@ -461,7 +461,7 @@
           <a:p>
             <a:fld id="{25CC940E-691B-47B1-B51D-00F434A09068}" type="datetimeFigureOut">
               <a:rPr lang="en-150" smtClean="0"/>
-              <a:t>03/04/2023</a:t>
+              <a:t>10/04/2023</a:t>
             </a:fld>
             <a:endParaRPr lang="en-150"/>
           </a:p>
@@ -671,7 +671,7 @@
           <a:p>
             <a:fld id="{25CC940E-691B-47B1-B51D-00F434A09068}" type="datetimeFigureOut">
               <a:rPr lang="en-150" smtClean="0"/>
-              <a:t>03/04/2023</a:t>
+              <a:t>10/04/2023</a:t>
             </a:fld>
             <a:endParaRPr lang="en-150"/>
           </a:p>
@@ -871,7 +871,7 @@
           <a:p>
             <a:fld id="{25CC940E-691B-47B1-B51D-00F434A09068}" type="datetimeFigureOut">
               <a:rPr lang="en-150" smtClean="0"/>
-              <a:t>03/04/2023</a:t>
+              <a:t>10/04/2023</a:t>
             </a:fld>
             <a:endParaRPr lang="en-150"/>
           </a:p>
@@ -1147,7 +1147,7 @@
           <a:p>
             <a:fld id="{25CC940E-691B-47B1-B51D-00F434A09068}" type="datetimeFigureOut">
               <a:rPr lang="en-150" smtClean="0"/>
-              <a:t>03/04/2023</a:t>
+              <a:t>10/04/2023</a:t>
             </a:fld>
             <a:endParaRPr lang="en-150"/>
           </a:p>
@@ -1415,7 +1415,7 @@
           <a:p>
             <a:fld id="{25CC940E-691B-47B1-B51D-00F434A09068}" type="datetimeFigureOut">
               <a:rPr lang="en-150" smtClean="0"/>
-              <a:t>03/04/2023</a:t>
+              <a:t>10/04/2023</a:t>
             </a:fld>
             <a:endParaRPr lang="en-150"/>
           </a:p>
@@ -1830,7 +1830,7 @@
           <a:p>
             <a:fld id="{25CC940E-691B-47B1-B51D-00F434A09068}" type="datetimeFigureOut">
               <a:rPr lang="en-150" smtClean="0"/>
-              <a:t>03/04/2023</a:t>
+              <a:t>10/04/2023</a:t>
             </a:fld>
             <a:endParaRPr lang="en-150"/>
           </a:p>
@@ -1972,7 +1972,7 @@
           <a:p>
             <a:fld id="{25CC940E-691B-47B1-B51D-00F434A09068}" type="datetimeFigureOut">
               <a:rPr lang="en-150" smtClean="0"/>
-              <a:t>03/04/2023</a:t>
+              <a:t>10/04/2023</a:t>
             </a:fld>
             <a:endParaRPr lang="en-150"/>
           </a:p>
@@ -2085,7 +2085,7 @@
           <a:p>
             <a:fld id="{25CC940E-691B-47B1-B51D-00F434A09068}" type="datetimeFigureOut">
               <a:rPr lang="en-150" smtClean="0"/>
-              <a:t>03/04/2023</a:t>
+              <a:t>10/04/2023</a:t>
             </a:fld>
             <a:endParaRPr lang="en-150"/>
           </a:p>
@@ -2398,7 +2398,7 @@
           <a:p>
             <a:fld id="{25CC940E-691B-47B1-B51D-00F434A09068}" type="datetimeFigureOut">
               <a:rPr lang="en-150" smtClean="0"/>
-              <a:t>03/04/2023</a:t>
+              <a:t>10/04/2023</a:t>
             </a:fld>
             <a:endParaRPr lang="en-150"/>
           </a:p>
@@ -2687,7 +2687,7 @@
           <a:p>
             <a:fld id="{25CC940E-691B-47B1-B51D-00F434A09068}" type="datetimeFigureOut">
               <a:rPr lang="en-150" smtClean="0"/>
-              <a:t>03/04/2023</a:t>
+              <a:t>10/04/2023</a:t>
             </a:fld>
             <a:endParaRPr lang="en-150"/>
           </a:p>
@@ -2930,7 +2930,7 @@
           <a:p>
             <a:fld id="{25CC940E-691B-47B1-B51D-00F434A09068}" type="datetimeFigureOut">
               <a:rPr lang="en-150" smtClean="0"/>
-              <a:t>03/04/2023</a:t>
+              <a:t>10/04/2023</a:t>
             </a:fld>
             <a:endParaRPr lang="en-150"/>
           </a:p>
@@ -3904,10 +3904,10 @@
       </p:pic>
       <p:pic>
         <p:nvPicPr>
-          <p:cNvPr id="44" name="Picture 43" descr="A picture containing indoor&#10;&#10;Description automatically generated">
-            <a:extLst>
-              <a:ext uri="{FF2B5EF4-FFF2-40B4-BE49-F238E27FC236}">
-                <a16:creationId xmlns:a16="http://schemas.microsoft.com/office/drawing/2014/main" id="{0B8E4961-6D34-55D9-B9CB-051B32E255EE}"/>
+          <p:cNvPr id="3" name="Picture 2" descr="A picture containing appliance, equipment&#10;&#10;Description automatically generated">
+            <a:extLst>
+              <a:ext uri="{FF2B5EF4-FFF2-40B4-BE49-F238E27FC236}">
+                <a16:creationId xmlns:a16="http://schemas.microsoft.com/office/drawing/2014/main" id="{18902E5C-20BE-9AA7-45F2-DE3FB1AF77DC}"/>
               </a:ext>
             </a:extLst>
           </p:cNvPr>
@@ -3924,13 +3924,13 @@
               </a:ext>
             </a:extLst>
           </a:blip>
-          <a:srcRect l="6345" t="13562" r="10030" b="5359"/>
+          <a:srcRect l="17742" t="6349" r="20303" b="7483"/>
           <a:stretch/>
         </p:blipFill>
         <p:spPr>
           <a:xfrm>
-            <a:off x="7923304" y="2119210"/>
-            <a:ext cx="3655271" cy="4103529"/>
+            <a:off x="8015078" y="1969515"/>
+            <a:ext cx="3374489" cy="4061202"/>
           </a:xfrm>
           <a:prstGeom prst="rect">
             <a:avLst/>

</xml_diff>